<commit_message>
first complete version after fixing most of the stuff
</commit_message>
<xml_diff>
--- a/Presentation1.pptx
+++ b/Presentation1.pptx
@@ -290,7 +290,7 @@
           <a:p>
             <a:fld id="{7BE16800-7F20-4647-9696-F64818BA3B76}" type="datetimeFigureOut">
               <a:rPr lang="en-US" smtClean="0"/>
-              <a:t>6/30/15</a:t>
+              <a:t>7/12/15</a:t>
             </a:fld>
             <a:endParaRPr lang="en-US"/>
           </a:p>
@@ -460,7 +460,7 @@
           <a:p>
             <a:fld id="{7BE16800-7F20-4647-9696-F64818BA3B76}" type="datetimeFigureOut">
               <a:rPr lang="en-US" smtClean="0"/>
-              <a:t>6/30/15</a:t>
+              <a:t>7/12/15</a:t>
             </a:fld>
             <a:endParaRPr lang="en-US"/>
           </a:p>
@@ -640,7 +640,7 @@
           <a:p>
             <a:fld id="{7BE16800-7F20-4647-9696-F64818BA3B76}" type="datetimeFigureOut">
               <a:rPr lang="en-US" smtClean="0"/>
-              <a:t>6/30/15</a:t>
+              <a:t>7/12/15</a:t>
             </a:fld>
             <a:endParaRPr lang="en-US"/>
           </a:p>
@@ -890,7 +890,7 @@
                 <a:latin typeface="Calibri"/>
               </a:rPr>
               <a:pPr/>
-              <a:t>6/30/15</a:t>
+              <a:t>7/12/15</a:t>
             </a:fld>
             <a:endParaRPr lang="en-US">
               <a:solidFill>
@@ -1684,7 +1684,7 @@
               <a:pPr>
                 <a:defRPr/>
               </a:pPr>
-              <a:t>6/30/15</a:t>
+              <a:t>7/12/15</a:t>
             </a:fld>
             <a:endParaRPr lang="en-US">
               <a:solidFill>
@@ -1911,7 +1911,7 @@
                 <a:latin typeface="Calibri"/>
               </a:rPr>
               <a:pPr/>
-              <a:t>6/30/15</a:t>
+              <a:t>7/12/15</a:t>
             </a:fld>
             <a:endParaRPr lang="en-US">
               <a:solidFill>
@@ -2190,7 +2190,7 @@
                 <a:latin typeface="Calibri"/>
               </a:rPr>
               <a:pPr/>
-              <a:t>6/30/15</a:t>
+              <a:t>7/12/15</a:t>
             </a:fld>
             <a:endParaRPr lang="en-US">
               <a:solidFill>
@@ -2511,7 +2511,7 @@
                 <a:latin typeface="Calibri"/>
               </a:rPr>
               <a:pPr/>
-              <a:t>6/30/15</a:t>
+              <a:t>7/12/15</a:t>
             </a:fld>
             <a:endParaRPr lang="en-US">
               <a:solidFill>
@@ -2966,7 +2966,7 @@
                 <a:latin typeface="Calibri"/>
               </a:rPr>
               <a:pPr/>
-              <a:t>6/30/15</a:t>
+              <a:t>7/12/15</a:t>
             </a:fld>
             <a:endParaRPr lang="en-US">
               <a:solidFill>
@@ -3117,7 +3117,7 @@
                 <a:latin typeface="Calibri"/>
               </a:rPr>
               <a:pPr/>
-              <a:t>6/30/15</a:t>
+              <a:t>7/12/15</a:t>
             </a:fld>
             <a:endParaRPr lang="en-US">
               <a:solidFill>
@@ -3245,7 +3245,7 @@
                 <a:latin typeface="Calibri"/>
               </a:rPr>
               <a:pPr/>
-              <a:t>6/30/15</a:t>
+              <a:t>7/12/15</a:t>
             </a:fld>
             <a:endParaRPr lang="en-US">
               <a:solidFill>
@@ -3440,7 +3440,7 @@
           <a:p>
             <a:fld id="{7BE16800-7F20-4647-9696-F64818BA3B76}" type="datetimeFigureOut">
               <a:rPr lang="en-US" smtClean="0"/>
-              <a:t>6/30/15</a:t>
+              <a:t>7/12/15</a:t>
             </a:fld>
             <a:endParaRPr lang="en-US"/>
           </a:p>
@@ -3725,7 +3725,7 @@
                 <a:latin typeface="Calibri"/>
               </a:rPr>
               <a:pPr/>
-              <a:t>6/30/15</a:t>
+              <a:t>7/12/15</a:t>
             </a:fld>
             <a:endParaRPr lang="en-US">
               <a:solidFill>
@@ -4011,7 +4011,7 @@
                 <a:latin typeface="Calibri"/>
               </a:rPr>
               <a:pPr/>
-              <a:t>6/30/15</a:t>
+              <a:t>7/12/15</a:t>
             </a:fld>
             <a:endParaRPr lang="en-US">
               <a:solidFill>
@@ -4214,7 +4214,7 @@
                 <a:latin typeface="Calibri"/>
               </a:rPr>
               <a:pPr/>
-              <a:t>6/30/15</a:t>
+              <a:t>7/12/15</a:t>
             </a:fld>
             <a:endParaRPr lang="en-US">
               <a:solidFill>
@@ -4427,7 +4427,7 @@
                 <a:latin typeface="Calibri"/>
               </a:rPr>
               <a:pPr/>
-              <a:t>6/30/15</a:t>
+              <a:t>7/12/15</a:t>
             </a:fld>
             <a:endParaRPr lang="en-US">
               <a:solidFill>
@@ -4698,7 +4698,7 @@
           <a:p>
             <a:fld id="{7BE16800-7F20-4647-9696-F64818BA3B76}" type="datetimeFigureOut">
               <a:rPr lang="en-US" smtClean="0"/>
-              <a:t>6/30/15</a:t>
+              <a:t>7/12/15</a:t>
             </a:fld>
             <a:endParaRPr lang="en-US"/>
           </a:p>
@@ -4986,7 +4986,7 @@
           <a:p>
             <a:fld id="{7BE16800-7F20-4647-9696-F64818BA3B76}" type="datetimeFigureOut">
               <a:rPr lang="en-US" smtClean="0"/>
-              <a:t>6/30/15</a:t>
+              <a:t>7/12/15</a:t>
             </a:fld>
             <a:endParaRPr lang="en-US"/>
           </a:p>
@@ -5408,7 +5408,7 @@
           <a:p>
             <a:fld id="{7BE16800-7F20-4647-9696-F64818BA3B76}" type="datetimeFigureOut">
               <a:rPr lang="en-US" smtClean="0"/>
-              <a:t>6/30/15</a:t>
+              <a:t>7/12/15</a:t>
             </a:fld>
             <a:endParaRPr lang="en-US"/>
           </a:p>
@@ -5526,7 +5526,7 @@
           <a:p>
             <a:fld id="{7BE16800-7F20-4647-9696-F64818BA3B76}" type="datetimeFigureOut">
               <a:rPr lang="en-US" smtClean="0"/>
-              <a:t>6/30/15</a:t>
+              <a:t>7/12/15</a:t>
             </a:fld>
             <a:endParaRPr lang="en-US"/>
           </a:p>
@@ -5621,7 +5621,7 @@
           <a:p>
             <a:fld id="{7BE16800-7F20-4647-9696-F64818BA3B76}" type="datetimeFigureOut">
               <a:rPr lang="en-US" smtClean="0"/>
-              <a:t>6/30/15</a:t>
+              <a:t>7/12/15</a:t>
             </a:fld>
             <a:endParaRPr lang="en-US"/>
           </a:p>
@@ -5898,7 +5898,7 @@
           <a:p>
             <a:fld id="{7BE16800-7F20-4647-9696-F64818BA3B76}" type="datetimeFigureOut">
               <a:rPr lang="en-US" smtClean="0"/>
-              <a:t>6/30/15</a:t>
+              <a:t>7/12/15</a:t>
             </a:fld>
             <a:endParaRPr lang="en-US"/>
           </a:p>
@@ -6155,7 +6155,7 @@
           <a:p>
             <a:fld id="{7BE16800-7F20-4647-9696-F64818BA3B76}" type="datetimeFigureOut">
               <a:rPr lang="en-US" smtClean="0"/>
-              <a:t>6/30/15</a:t>
+              <a:t>7/12/15</a:t>
             </a:fld>
             <a:endParaRPr lang="en-US"/>
           </a:p>
@@ -6368,7 +6368,7 @@
           <a:p>
             <a:fld id="{7BE16800-7F20-4647-9696-F64818BA3B76}" type="datetimeFigureOut">
               <a:rPr lang="en-US" smtClean="0"/>
-              <a:t>6/30/15</a:t>
+              <a:t>7/12/15</a:t>
             </a:fld>
             <a:endParaRPr lang="en-US"/>
           </a:p>
@@ -6871,7 +6871,7 @@
                 <a:latin typeface="Calibri"/>
               </a:rPr>
               <a:pPr/>
-              <a:t>6/30/15</a:t>
+              <a:t>7/12/15</a:t>
             </a:fld>
             <a:endParaRPr lang="en-US">
               <a:solidFill>
@@ -9625,7 +9625,7 @@
         <p:spPr>
           <a:xfrm>
             <a:off x="1141792" y="2331618"/>
-            <a:ext cx="636638" cy="369332"/>
+            <a:ext cx="586419" cy="338554"/>
           </a:xfrm>
           <a:prstGeom prst="rect">
             <a:avLst/>
@@ -9639,10 +9639,10 @@
           <a:lstStyle/>
           <a:p>
             <a:r>
-              <a:rPr lang="en-US" dirty="0" smtClean="0"/>
+              <a:rPr lang="en-US" sz="1600" dirty="0" smtClean="0"/>
               <a:t>Alice</a:t>
             </a:r>
-            <a:endParaRPr lang="en-US" dirty="0"/>
+            <a:endParaRPr lang="en-US" sz="1600" dirty="0"/>
           </a:p>
         </p:txBody>
       </p:sp>
@@ -9655,7 +9655,7 @@
         <p:spPr>
           <a:xfrm>
             <a:off x="6199086" y="2115265"/>
-            <a:ext cx="657140" cy="369332"/>
+            <a:ext cx="657140" cy="338554"/>
           </a:xfrm>
           <a:prstGeom prst="rect">
             <a:avLst/>
@@ -9669,7 +9669,7 @@
           <a:lstStyle/>
           <a:p>
             <a:r>
-              <a:rPr lang="en-US" dirty="0" smtClean="0"/>
+              <a:rPr lang="en-US" sz="1600" dirty="0" smtClean="0"/>
               <a:t>Bob</a:t>
             </a:r>
           </a:p>
@@ -9706,8 +9706,8 @@
         </p:nvCxnSpPr>
         <p:spPr>
           <a:xfrm flipV="1">
-            <a:off x="1778430" y="665790"/>
-            <a:ext cx="484479" cy="1384065"/>
+            <a:off x="1985818" y="665791"/>
+            <a:ext cx="277091" cy="1343127"/>
           </a:xfrm>
           <a:prstGeom prst="straightConnector1">
             <a:avLst/>
@@ -9771,9 +9771,9 @@
           <p:nvPr/>
         </p:nvSpPr>
         <p:spPr>
-          <a:xfrm rot="17331109">
-            <a:off x="1063080" y="1177035"/>
-            <a:ext cx="1582622" cy="369332"/>
+          <a:xfrm rot="16957755">
+            <a:off x="1230148" y="1192424"/>
+            <a:ext cx="1433205" cy="338554"/>
           </a:xfrm>
           <a:prstGeom prst="rect">
             <a:avLst/>
@@ -9787,10 +9787,10 @@
           <a:lstStyle/>
           <a:p>
             <a:r>
-              <a:rPr lang="en-US" dirty="0" smtClean="0"/>
+              <a:rPr lang="en-US" sz="1600" dirty="0" smtClean="0"/>
               <a:t>Bob’s address?</a:t>
             </a:r>
-            <a:endParaRPr lang="en-US" dirty="0"/>
+            <a:endParaRPr lang="en-US" sz="1600" dirty="0"/>
           </a:p>
         </p:txBody>
       </p:sp>
@@ -9802,8 +9802,8 @@
         </p:nvSpPr>
         <p:spPr>
           <a:xfrm>
-            <a:off x="5638263" y="1633300"/>
-            <a:ext cx="1646417" cy="369332"/>
+            <a:off x="6199086" y="2372184"/>
+            <a:ext cx="1484000" cy="338554"/>
           </a:xfrm>
           <a:prstGeom prst="rect">
             <a:avLst/>
@@ -9817,10 +9817,9 @@
           <a:lstStyle/>
           <a:p>
             <a:r>
-              <a:rPr lang="en-US" dirty="0"/>
+              <a:rPr lang="en-US" sz="1600" dirty="0"/>
               <a:t>128.119.240.93</a:t>
             </a:r>
-            <a:endParaRPr lang="en-US" dirty="0"/>
           </a:p>
         </p:txBody>
       </p:sp>
@@ -9832,8 +9831,8 @@
         </p:nvSpPr>
         <p:spPr>
           <a:xfrm rot="16200000">
-            <a:off x="1609162" y="1267784"/>
-            <a:ext cx="1646417" cy="369332"/>
+            <a:off x="1690370" y="1283173"/>
+            <a:ext cx="1484000" cy="338554"/>
           </a:xfrm>
           <a:prstGeom prst="rect">
             <a:avLst/>
@@ -9847,10 +9846,9 @@
           <a:lstStyle/>
           <a:p>
             <a:r>
-              <a:rPr lang="en-US" dirty="0"/>
+              <a:rPr lang="en-US" sz="1600" dirty="0"/>
               <a:t>128.119.240.93</a:t>
             </a:r>
-            <a:endParaRPr lang="en-US" dirty="0"/>
           </a:p>
         </p:txBody>
       </p:sp>
@@ -9862,8 +9860,8 @@
         </p:nvSpPr>
         <p:spPr>
           <a:xfrm>
-            <a:off x="1211845" y="1264374"/>
-            <a:ext cx="424191" cy="519351"/>
+            <a:off x="7613816" y="566760"/>
+            <a:ext cx="405912" cy="476071"/>
           </a:xfrm>
           <a:prstGeom prst="ellipse">
             <a:avLst/>
@@ -9890,10 +9888,10 @@
           <a:lstStyle/>
           <a:p>
             <a:r>
-              <a:rPr lang="en-US" dirty="0" smtClean="0"/>
+              <a:rPr lang="en-US" sz="1600" dirty="0" smtClean="0"/>
               <a:t>1</a:t>
             </a:r>
-            <a:endParaRPr lang="en-US" dirty="0"/>
+            <a:endParaRPr lang="en-US" sz="1600" dirty="0"/>
           </a:p>
         </p:txBody>
       </p:sp>
@@ -9905,8 +9903,8 @@
         </p:nvSpPr>
         <p:spPr>
           <a:xfrm>
-            <a:off x="2673830" y="1252879"/>
-            <a:ext cx="424191" cy="519351"/>
+            <a:off x="6955226" y="1962738"/>
+            <a:ext cx="405912" cy="476071"/>
           </a:xfrm>
           <a:prstGeom prst="ellipse">
             <a:avLst/>
@@ -9933,10 +9931,9 @@
           <a:lstStyle/>
           <a:p>
             <a:r>
-              <a:rPr lang="en-US" dirty="0"/>
+              <a:rPr lang="en-US" sz="1600" dirty="0"/>
               <a:t>2</a:t>
             </a:r>
-            <a:endParaRPr lang="en-US" dirty="0"/>
           </a:p>
         </p:txBody>
       </p:sp>
@@ -10004,8 +10001,8 @@
         </p:nvSpPr>
         <p:spPr>
           <a:xfrm>
-            <a:off x="3124485" y="1910558"/>
-            <a:ext cx="424191" cy="519351"/>
+            <a:off x="5359303" y="970315"/>
+            <a:ext cx="405912" cy="476071"/>
           </a:xfrm>
           <a:prstGeom prst="ellipse">
             <a:avLst/>
@@ -10032,10 +10029,10 @@
           <a:lstStyle/>
           <a:p>
             <a:r>
-              <a:rPr lang="en-US" dirty="0" smtClean="0"/>
+              <a:rPr lang="en-US" sz="1600" dirty="0" smtClean="0"/>
               <a:t>3</a:t>
             </a:r>
-            <a:endParaRPr lang="en-US" dirty="0"/>
+            <a:endParaRPr lang="en-US" sz="1600" dirty="0"/>
           </a:p>
         </p:txBody>
       </p:sp>
@@ -10048,7 +10045,7 @@
         <p:spPr>
           <a:xfrm>
             <a:off x="3525786" y="1974023"/>
-            <a:ext cx="2112477" cy="369332"/>
+            <a:ext cx="1898276" cy="338554"/>
           </a:xfrm>
           <a:prstGeom prst="rect">
             <a:avLst/>
@@ -10062,10 +10059,279 @@
           <a:lstStyle/>
           <a:p>
             <a:r>
-              <a:rPr lang="en-US" dirty="0" smtClean="0"/>
+              <a:rPr lang="en-US" sz="1600" dirty="0" smtClean="0"/>
               <a:t>Establish connection</a:t>
             </a:r>
-            <a:endParaRPr lang="en-US" dirty="0"/>
+            <a:endParaRPr lang="en-US" sz="1600" dirty="0"/>
+          </a:p>
+        </p:txBody>
+      </p:sp>
+      <p:sp>
+        <p:nvSpPr>
+          <p:cNvPr id="18" name="TextBox 17"/>
+          <p:cNvSpPr txBox="1"/>
+          <p:nvPr/>
+        </p:nvSpPr>
+        <p:spPr>
+          <a:xfrm>
+            <a:off x="7569449" y="1035133"/>
+            <a:ext cx="657140" cy="338554"/>
+          </a:xfrm>
+          <a:prstGeom prst="rect">
+            <a:avLst/>
+          </a:prstGeom>
+          <a:noFill/>
+        </p:spPr>
+        <p:txBody>
+          <a:bodyPr wrap="square" rtlCol="0">
+            <a:spAutoFit/>
+          </a:bodyPr>
+          <a:lstStyle/>
+          <a:p>
+            <a:r>
+              <a:rPr lang="en-US" sz="1600" dirty="0" smtClean="0"/>
+              <a:t>Bob</a:t>
+            </a:r>
+          </a:p>
+        </p:txBody>
+      </p:sp>
+      <p:sp>
+        <p:nvSpPr>
+          <p:cNvPr id="19" name="TextBox 18"/>
+          <p:cNvSpPr txBox="1"/>
+          <p:nvPr/>
+        </p:nvSpPr>
+        <p:spPr>
+          <a:xfrm>
+            <a:off x="7569449" y="1251486"/>
+            <a:ext cx="1484000" cy="338554"/>
+          </a:xfrm>
+          <a:prstGeom prst="rect">
+            <a:avLst/>
+          </a:prstGeom>
+          <a:noFill/>
+        </p:spPr>
+        <p:txBody>
+          <a:bodyPr wrap="none" rtlCol="0">
+            <a:spAutoFit/>
+          </a:bodyPr>
+          <a:lstStyle/>
+          <a:p>
+            <a:r>
+              <a:rPr lang="en-US" sz="1600" dirty="0" smtClean="0"/>
+              <a:t>213.98.221.167</a:t>
+            </a:r>
+            <a:endParaRPr lang="en-US" sz="1600" dirty="0"/>
+          </a:p>
+        </p:txBody>
+      </p:sp>
+      <p:pic>
+        <p:nvPicPr>
+          <p:cNvPr id="24" name="Picture 23"/>
+          <p:cNvPicPr>
+            <a:picLocks noChangeAspect="1"/>
+          </p:cNvPicPr>
+          <p:nvPr/>
+        </p:nvPicPr>
+        <p:blipFill rotWithShape="1">
+          <a:blip r:embed="rId2"/>
+          <a:srcRect l="18542" t="9058" r="15126" b="7470"/>
+          <a:stretch/>
+        </p:blipFill>
+        <p:spPr>
+          <a:xfrm>
+            <a:off x="7262616" y="1008531"/>
+            <a:ext cx="306833" cy="612287"/>
+          </a:xfrm>
+          <a:prstGeom prst="rect">
+            <a:avLst/>
+          </a:prstGeom>
+        </p:spPr>
+      </p:pic>
+      <p:cxnSp>
+        <p:nvCxnSpPr>
+          <p:cNvPr id="26" name="Straight Arrow Connector 25"/>
+          <p:cNvCxnSpPr/>
+          <p:nvPr/>
+        </p:nvCxnSpPr>
+        <p:spPr>
+          <a:xfrm flipH="1">
+            <a:off x="6684818" y="1404465"/>
+            <a:ext cx="473364" cy="710800"/>
+          </a:xfrm>
+          <a:prstGeom prst="straightConnector1">
+            <a:avLst/>
+          </a:prstGeom>
+          <a:ln>
+            <a:prstDash val="dash"/>
+            <a:tailEnd type="arrow"/>
+          </a:ln>
+        </p:spPr>
+        <p:style>
+          <a:lnRef idx="2">
+            <a:schemeClr val="accent1"/>
+          </a:lnRef>
+          <a:fillRef idx="0">
+            <a:schemeClr val="accent1"/>
+          </a:fillRef>
+          <a:effectRef idx="1">
+            <a:schemeClr val="accent1"/>
+          </a:effectRef>
+          <a:fontRef idx="minor">
+            <a:schemeClr val="tx1"/>
+          </a:fontRef>
+        </p:style>
+      </p:cxnSp>
+      <p:cxnSp>
+        <p:nvCxnSpPr>
+          <p:cNvPr id="28" name="Straight Arrow Connector 27"/>
+          <p:cNvCxnSpPr/>
+          <p:nvPr/>
+        </p:nvCxnSpPr>
+        <p:spPr>
+          <a:xfrm flipV="1">
+            <a:off x="6063673" y="750455"/>
+            <a:ext cx="0" cy="1258463"/>
+          </a:xfrm>
+          <a:prstGeom prst="straightConnector1">
+            <a:avLst/>
+          </a:prstGeom>
+          <a:ln>
+            <a:tailEnd type="arrow"/>
+          </a:ln>
+        </p:spPr>
+        <p:style>
+          <a:lnRef idx="2">
+            <a:schemeClr val="accent1"/>
+          </a:lnRef>
+          <a:fillRef idx="0">
+            <a:schemeClr val="accent1"/>
+          </a:fillRef>
+          <a:effectRef idx="1">
+            <a:schemeClr val="accent1"/>
+          </a:effectRef>
+          <a:fontRef idx="minor">
+            <a:schemeClr val="tx1"/>
+          </a:fontRef>
+        </p:style>
+      </p:cxnSp>
+      <p:sp>
+        <p:nvSpPr>
+          <p:cNvPr id="30" name="TextBox 29"/>
+          <p:cNvSpPr txBox="1"/>
+          <p:nvPr/>
+        </p:nvSpPr>
+        <p:spPr>
+          <a:xfrm rot="16200000">
+            <a:off x="5131297" y="1221491"/>
+            <a:ext cx="1495421" cy="338554"/>
+          </a:xfrm>
+          <a:prstGeom prst="rect">
+            <a:avLst/>
+          </a:prstGeom>
+          <a:noFill/>
+        </p:spPr>
+        <p:txBody>
+          <a:bodyPr wrap="none" rtlCol="0">
+            <a:spAutoFit/>
+          </a:bodyPr>
+          <a:lstStyle/>
+          <a:p>
+            <a:r>
+              <a:rPr lang="en-US" sz="1600" dirty="0" smtClean="0"/>
+              <a:t>Update addres</a:t>
+            </a:r>
+            <a:r>
+              <a:rPr lang="en-US" sz="1600" dirty="0" smtClean="0"/>
+              <a:t>s</a:t>
+            </a:r>
+            <a:endParaRPr lang="en-US" sz="1600" dirty="0"/>
+          </a:p>
+        </p:txBody>
+      </p:sp>
+      <p:sp>
+        <p:nvSpPr>
+          <p:cNvPr id="33" name="TextBox 32"/>
+          <p:cNvSpPr txBox="1"/>
+          <p:nvPr/>
+        </p:nvSpPr>
+        <p:spPr>
+          <a:xfrm>
+            <a:off x="1380526" y="1201271"/>
+            <a:ext cx="405912" cy="476071"/>
+          </a:xfrm>
+          <a:prstGeom prst="ellipse">
+            <a:avLst/>
+          </a:prstGeom>
+        </p:spPr>
+        <p:style>
+          <a:lnRef idx="1">
+            <a:schemeClr val="accent3"/>
+          </a:lnRef>
+          <a:fillRef idx="2">
+            <a:schemeClr val="accent3"/>
+          </a:fillRef>
+          <a:effectRef idx="1">
+            <a:schemeClr val="accent3"/>
+          </a:effectRef>
+          <a:fontRef idx="minor">
+            <a:schemeClr val="dk1"/>
+          </a:fontRef>
+        </p:style>
+        <p:txBody>
+          <a:bodyPr wrap="none" rtlCol="0">
+            <a:spAutoFit/>
+          </a:bodyPr>
+          <a:lstStyle/>
+          <a:p>
+            <a:r>
+              <a:rPr lang="en-US" sz="1600" dirty="0"/>
+              <a:t>4</a:t>
+            </a:r>
+            <a:endParaRPr lang="en-US" sz="1600" dirty="0"/>
+          </a:p>
+        </p:txBody>
+      </p:sp>
+      <p:sp>
+        <p:nvSpPr>
+          <p:cNvPr id="34" name="TextBox 33"/>
+          <p:cNvSpPr txBox="1"/>
+          <p:nvPr/>
+        </p:nvSpPr>
+        <p:spPr>
+          <a:xfrm>
+            <a:off x="3591450" y="1567752"/>
+            <a:ext cx="405912" cy="476071"/>
+          </a:xfrm>
+          <a:prstGeom prst="ellipse">
+            <a:avLst/>
+          </a:prstGeom>
+        </p:spPr>
+        <p:style>
+          <a:lnRef idx="1">
+            <a:schemeClr val="accent3"/>
+          </a:lnRef>
+          <a:fillRef idx="2">
+            <a:schemeClr val="accent3"/>
+          </a:fillRef>
+          <a:effectRef idx="1">
+            <a:schemeClr val="accent3"/>
+          </a:effectRef>
+          <a:fontRef idx="minor">
+            <a:schemeClr val="dk1"/>
+          </a:fontRef>
+        </p:style>
+        <p:txBody>
+          <a:bodyPr wrap="none" rtlCol="0">
+            <a:spAutoFit/>
+          </a:bodyPr>
+          <a:lstStyle/>
+          <a:p>
+            <a:r>
+              <a:rPr lang="en-US" sz="1600" dirty="0" smtClean="0"/>
+              <a:t>5</a:t>
+            </a:r>
+            <a:endParaRPr lang="en-US" sz="1600" dirty="0"/>
           </a:p>
         </p:txBody>
       </p:sp>

</xml_diff>